<commit_message>
Updating OspreyInterns ReportGeneration to match ospreymed ReportGeneration
</commit_message>
<xml_diff>
--- a/Slide-Template.pptx
+++ b/Slide-Template.pptx
@@ -1303,7 +1303,7 @@
           <a:p>
             <a:fld id="{AEAC36A3-06E8-0B48-A794-DAFE9C0A3652}" type="datetimeFigureOut">
               <a:rPr lang="en-US" smtClean="0"/>
-              <a:t>6/24/2019</a:t>
+              <a:t>9/21/2020</a:t>
             </a:fld>
             <a:endParaRPr lang="en-US"/>
           </a:p>
@@ -1468,7 +1468,7 @@
           <a:p>
             <a:fld id="{076E244C-5249-174B-8689-0AD22DF8FBA1}" type="datetimeFigureOut">
               <a:rPr lang="en-US" smtClean="0"/>
-              <a:t>6/24/2019</a:t>
+              <a:t>9/21/2020</a:t>
             </a:fld>
             <a:endParaRPr lang="en-US"/>
           </a:p>
@@ -3557,7 +3557,7 @@
       </a:lvl9pPr>
     </p:otherStyle>
   </p:txStyles>
-  <p:extLst mod="1">
+  <p:extLst>
     <p:ext uri="{27BBF7A9-308A-43DC-89C8-2F10F3537804}">
       <p15:sldGuideLst xmlns:p15="http://schemas.microsoft.com/office/powerpoint/2012/main">
         <p15:guide id="1" orient="horz" pos="2160" userDrawn="1">
@@ -5494,7 +5494,11 @@
           <a:p>
             <a:r>
               <a:rPr lang="en-US" sz="800" dirty="0"/>
-              <a:t>This product, and its use, may be protected by US Patents and pending applications. DyeVert is a trademark of Osprey Medical, Inc. © Osprey Medical, Inc. 2019 All Rights Reserved. PR0224 Rev B</a:t>
+              <a:t>This product, and its use, may be protected by US Patents and pending applications. DyeVert is a trademark of Osprey Medical, Inc. © Osprey Medical, Inc. 2019 All Rights Reserved. PR0224 </a:t>
+            </a:r>
+            <a:r>
+              <a:rPr lang="en-US" sz="800"/>
+              <a:t>Rev C</a:t>
             </a:r>
             <a:endParaRPr lang="en-US" sz="800" i="1" dirty="0"/>
           </a:p>

</xml_diff>